<commit_message>
Sprint 2 Review Retrospective
added retrospective to title of the presentation
</commit_message>
<xml_diff>
--- a/docs/scrum/sprint2/Sprint 2 Review_Retrospective 06252015.pptx
+++ b/docs/scrum/sprint2/Sprint 2 Review_Retrospective 06252015.pptx
@@ -222,7 +222,7 @@
             <a:fld id="{93F31936-34FB-46D7-8B5B-9A9CF58989DC}" type="datetimeFigureOut">
               <a:rPr lang="en-US" smtClean="0"/>
               <a:pPr/>
-              <a:t>6/25/2015</a:t>
+              <a:t>6/29/2015</a:t>
             </a:fld>
             <a:endParaRPr lang="en-US"/>
           </a:p>
@@ -2444,7 +2444,7 @@
             <a:fld id="{31CC4B11-A6A5-4D9E-9368-043FB2A4AF23}" type="datetimeFigureOut">
               <a:rPr lang="en-US" smtClean="0"/>
               <a:pPr/>
-              <a:t>6/25/2015</a:t>
+              <a:t>6/29/2015</a:t>
             </a:fld>
             <a:endParaRPr lang="en-US"/>
           </a:p>
@@ -2611,7 +2611,7 @@
             <a:fld id="{31CC4B11-A6A5-4D9E-9368-043FB2A4AF23}" type="datetimeFigureOut">
               <a:rPr lang="en-US" smtClean="0"/>
               <a:pPr/>
-              <a:t>6/25/2015</a:t>
+              <a:t>6/29/2015</a:t>
             </a:fld>
             <a:endParaRPr lang="en-US"/>
           </a:p>
@@ -2788,7 +2788,7 @@
             <a:fld id="{31CC4B11-A6A5-4D9E-9368-043FB2A4AF23}" type="datetimeFigureOut">
               <a:rPr lang="en-US" smtClean="0"/>
               <a:pPr/>
-              <a:t>6/25/2015</a:t>
+              <a:t>6/29/2015</a:t>
             </a:fld>
             <a:endParaRPr lang="en-US"/>
           </a:p>
@@ -2955,7 +2955,7 @@
             <a:fld id="{31CC4B11-A6A5-4D9E-9368-043FB2A4AF23}" type="datetimeFigureOut">
               <a:rPr lang="en-US" smtClean="0"/>
               <a:pPr/>
-              <a:t>6/25/2015</a:t>
+              <a:t>6/29/2015</a:t>
             </a:fld>
             <a:endParaRPr lang="en-US"/>
           </a:p>
@@ -3198,7 +3198,7 @@
             <a:fld id="{31CC4B11-A6A5-4D9E-9368-043FB2A4AF23}" type="datetimeFigureOut">
               <a:rPr lang="en-US" smtClean="0"/>
               <a:pPr/>
-              <a:t>6/25/2015</a:t>
+              <a:t>6/29/2015</a:t>
             </a:fld>
             <a:endParaRPr lang="en-US"/>
           </a:p>
@@ -3483,7 +3483,7 @@
             <a:fld id="{31CC4B11-A6A5-4D9E-9368-043FB2A4AF23}" type="datetimeFigureOut">
               <a:rPr lang="en-US" smtClean="0"/>
               <a:pPr/>
-              <a:t>6/25/2015</a:t>
+              <a:t>6/29/2015</a:t>
             </a:fld>
             <a:endParaRPr lang="en-US"/>
           </a:p>
@@ -3902,7 +3902,7 @@
             <a:fld id="{31CC4B11-A6A5-4D9E-9368-043FB2A4AF23}" type="datetimeFigureOut">
               <a:rPr lang="en-US" smtClean="0"/>
               <a:pPr/>
-              <a:t>6/25/2015</a:t>
+              <a:t>6/29/2015</a:t>
             </a:fld>
             <a:endParaRPr lang="en-US"/>
           </a:p>
@@ -4017,7 +4017,7 @@
             <a:fld id="{31CC4B11-A6A5-4D9E-9368-043FB2A4AF23}" type="datetimeFigureOut">
               <a:rPr lang="en-US" smtClean="0"/>
               <a:pPr/>
-              <a:t>6/25/2015</a:t>
+              <a:t>6/29/2015</a:t>
             </a:fld>
             <a:endParaRPr lang="en-US"/>
           </a:p>
@@ -4109,7 +4109,7 @@
             <a:fld id="{31CC4B11-A6A5-4D9E-9368-043FB2A4AF23}" type="datetimeFigureOut">
               <a:rPr lang="en-US" smtClean="0"/>
               <a:pPr/>
-              <a:t>6/25/2015</a:t>
+              <a:t>6/29/2015</a:t>
             </a:fld>
             <a:endParaRPr lang="en-US"/>
           </a:p>
@@ -4383,7 +4383,7 @@
             <a:fld id="{31CC4B11-A6A5-4D9E-9368-043FB2A4AF23}" type="datetimeFigureOut">
               <a:rPr lang="en-US" smtClean="0"/>
               <a:pPr/>
-              <a:t>6/25/2015</a:t>
+              <a:t>6/29/2015</a:t>
             </a:fld>
             <a:endParaRPr lang="en-US"/>
           </a:p>
@@ -4637,7 +4637,7 @@
             <a:fld id="{31CC4B11-A6A5-4D9E-9368-043FB2A4AF23}" type="datetimeFigureOut">
               <a:rPr lang="en-US" smtClean="0"/>
               <a:pPr/>
-              <a:t>6/25/2015</a:t>
+              <a:t>6/29/2015</a:t>
             </a:fld>
             <a:endParaRPr lang="en-US"/>
           </a:p>
@@ -4861,7 +4861,7 @@
             <a:fld id="{31CC4B11-A6A5-4D9E-9368-043FB2A4AF23}" type="datetimeFigureOut">
               <a:rPr lang="en-US" smtClean="0"/>
               <a:pPr/>
-              <a:t>6/25/2015</a:t>
+              <a:t>6/29/2015</a:t>
             </a:fld>
             <a:endParaRPr lang="en-US"/>
           </a:p>
@@ -5731,6 +5731,15 @@
               </a:rPr>
               <a:t>Sprint 2 Review </a:t>
             </a:r>
+            <a:r>
+              <a:rPr lang="en-US" sz="2000" b="1" smtClean="0">
+                <a:latin typeface="Gill Sans MT" pitchFamily="34" charset="0"/>
+              </a:rPr>
+              <a:t>and Retrospective</a:t>
+            </a:r>
+            <a:endParaRPr lang="en-US" sz="2000" b="1" dirty="0" smtClean="0">
+              <a:latin typeface="Gill Sans MT" pitchFamily="34" charset="0"/>
+            </a:endParaRPr>
           </a:p>
           <a:p>
             <a:pPr algn="ctr"/>
@@ -10547,8 +10556,8 @@
     <ds:schemaRef ds:uri="http://schemas.microsoft.com/office/2006/metadata/properties"/>
     <ds:schemaRef ds:uri="http://purl.org/dc/terms/"/>
     <ds:schemaRef ds:uri="http://schemas.openxmlformats.org/package/2006/metadata/core-properties"/>
+    <ds:schemaRef ds:uri="http://purl.org/dc/dcmitype/"/>
     <ds:schemaRef ds:uri="http://schemas.microsoft.com/office/2006/documentManagement/types"/>
-    <ds:schemaRef ds:uri="http://purl.org/dc/dcmitype/"/>
     <ds:schemaRef ds:uri="http://www.w3.org/XML/1998/namespace"/>
   </ds:schemaRefs>
 </ds:datastoreItem>

</xml_diff>